<commit_message>
Add win plotting and week10 slides
</commit_message>
<xml_diff>
--- a/BayesOpt Pose Graph-Week10.pptx
+++ b/BayesOpt Pose Graph-Week10.pptx
@@ -269,7 +269,7 @@
           <a:p>
             <a:fld id="{EC1BCD71-190D-426B-85E9-B8B75E5C9734}" type="datetimeFigureOut">
               <a:rPr lang="en-GB" smtClean="0"/>
-              <a:t>13/07/2023</a:t>
+              <a:t>17/07/2023</a:t>
             </a:fld>
             <a:endParaRPr lang="en-GB"/>
           </a:p>
@@ -467,7 +467,7 @@
           <a:p>
             <a:fld id="{EC1BCD71-190D-426B-85E9-B8B75E5C9734}" type="datetimeFigureOut">
               <a:rPr lang="en-GB" smtClean="0"/>
-              <a:t>13/07/2023</a:t>
+              <a:t>17/07/2023</a:t>
             </a:fld>
             <a:endParaRPr lang="en-GB"/>
           </a:p>
@@ -675,7 +675,7 @@
           <a:p>
             <a:fld id="{EC1BCD71-190D-426B-85E9-B8B75E5C9734}" type="datetimeFigureOut">
               <a:rPr lang="en-GB" smtClean="0"/>
-              <a:t>13/07/2023</a:t>
+              <a:t>17/07/2023</a:t>
             </a:fld>
             <a:endParaRPr lang="en-GB"/>
           </a:p>
@@ -873,7 +873,7 @@
           <a:p>
             <a:fld id="{EC1BCD71-190D-426B-85E9-B8B75E5C9734}" type="datetimeFigureOut">
               <a:rPr lang="en-GB" smtClean="0"/>
-              <a:t>13/07/2023</a:t>
+              <a:t>17/07/2023</a:t>
             </a:fld>
             <a:endParaRPr lang="en-GB"/>
           </a:p>
@@ -1148,7 +1148,7 @@
           <a:p>
             <a:fld id="{EC1BCD71-190D-426B-85E9-B8B75E5C9734}" type="datetimeFigureOut">
               <a:rPr lang="en-GB" smtClean="0"/>
-              <a:t>13/07/2023</a:t>
+              <a:t>17/07/2023</a:t>
             </a:fld>
             <a:endParaRPr lang="en-GB"/>
           </a:p>
@@ -1413,7 +1413,7 @@
           <a:p>
             <a:fld id="{EC1BCD71-190D-426B-85E9-B8B75E5C9734}" type="datetimeFigureOut">
               <a:rPr lang="en-GB" smtClean="0"/>
-              <a:t>13/07/2023</a:t>
+              <a:t>17/07/2023</a:t>
             </a:fld>
             <a:endParaRPr lang="en-GB"/>
           </a:p>
@@ -1825,7 +1825,7 @@
           <a:p>
             <a:fld id="{EC1BCD71-190D-426B-85E9-B8B75E5C9734}" type="datetimeFigureOut">
               <a:rPr lang="en-GB" smtClean="0"/>
-              <a:t>13/07/2023</a:t>
+              <a:t>17/07/2023</a:t>
             </a:fld>
             <a:endParaRPr lang="en-GB"/>
           </a:p>
@@ -1966,7 +1966,7 @@
           <a:p>
             <a:fld id="{EC1BCD71-190D-426B-85E9-B8B75E5C9734}" type="datetimeFigureOut">
               <a:rPr lang="en-GB" smtClean="0"/>
-              <a:t>13/07/2023</a:t>
+              <a:t>17/07/2023</a:t>
             </a:fld>
             <a:endParaRPr lang="en-GB"/>
           </a:p>
@@ -2079,7 +2079,7 @@
           <a:p>
             <a:fld id="{EC1BCD71-190D-426B-85E9-B8B75E5C9734}" type="datetimeFigureOut">
               <a:rPr lang="en-GB" smtClean="0"/>
-              <a:t>13/07/2023</a:t>
+              <a:t>17/07/2023</a:t>
             </a:fld>
             <a:endParaRPr lang="en-GB"/>
           </a:p>
@@ -2390,7 +2390,7 @@
           <a:p>
             <a:fld id="{EC1BCD71-190D-426B-85E9-B8B75E5C9734}" type="datetimeFigureOut">
               <a:rPr lang="en-GB" smtClean="0"/>
-              <a:t>13/07/2023</a:t>
+              <a:t>17/07/2023</a:t>
             </a:fld>
             <a:endParaRPr lang="en-GB"/>
           </a:p>
@@ -2681,7 +2681,7 @@
           <a:p>
             <a:fld id="{EC1BCD71-190D-426B-85E9-B8B75E5C9734}" type="datetimeFigureOut">
               <a:rPr lang="en-GB" smtClean="0"/>
-              <a:t>13/07/2023</a:t>
+              <a:t>17/07/2023</a:t>
             </a:fld>
             <a:endParaRPr lang="en-GB"/>
           </a:p>
@@ -2922,7 +2922,7 @@
           <a:p>
             <a:fld id="{EC1BCD71-190D-426B-85E9-B8B75E5C9734}" type="datetimeFigureOut">
               <a:rPr lang="en-GB" smtClean="0"/>
-              <a:t>13/07/2023</a:t>
+              <a:t>17/07/2023</a:t>
             </a:fld>
             <a:endParaRPr lang="en-GB"/>
           </a:p>
@@ -3371,7 +3371,7 @@
             </a:br>
             <a:r>
               <a:rPr lang="en-US" altLang="zh-CN" dirty="0"/>
-              <a:t>13</a:t>
+              <a:t>16</a:t>
             </a:r>
             <a:r>
               <a:rPr lang="en-US" altLang="zh-CN" baseline="30000" dirty="0"/>
@@ -3667,8 +3667,79 @@
         </p:nvSpPr>
         <p:spPr/>
         <p:txBody>
-          <a:bodyPr/>
-          <a:lstStyle/>
+          <a:bodyPr>
+            <a:normAutofit fontScale="92500" lnSpcReduction="10000"/>
+          </a:bodyPr>
+          <a:lstStyle/>
+          <a:p>
+            <a:r>
+              <a:rPr lang="en-GB" strike="sngStrike" dirty="0"/>
+              <a:t>Generate </a:t>
+            </a:r>
+            <a:r>
+              <a:rPr lang="en-GB" strike="sngStrike" dirty="0" err="1"/>
+              <a:t>LandmarkVehicleTracking</a:t>
+            </a:r>
+            <a:r>
+              <a:rPr lang="en-GB" strike="sngStrike" dirty="0"/>
+              <a:t> graphs</a:t>
+            </a:r>
+          </a:p>
+          <a:p>
+            <a:endParaRPr lang="en-GB" dirty="0"/>
+          </a:p>
+          <a:p>
+            <a:r>
+              <a:rPr lang="en-GB" dirty="0"/>
+              <a:t>Explore </a:t>
+            </a:r>
+            <a:r>
+              <a:rPr lang="en-GB" dirty="0" err="1"/>
+              <a:t>BayesOpt</a:t>
+            </a:r>
+            <a:endParaRPr lang="en-GB" dirty="0"/>
+          </a:p>
+          <a:p>
+            <a:endParaRPr lang="en-GB" dirty="0"/>
+          </a:p>
+          <a:p>
+            <a:r>
+              <a:rPr lang="en-GB" dirty="0" err="1"/>
+              <a:t>BayeOpt</a:t>
+            </a:r>
+            <a:r>
+              <a:rPr lang="en-GB" dirty="0"/>
+              <a:t> to learn elements in Q (GPS system)</a:t>
+            </a:r>
+          </a:p>
+          <a:p>
+            <a:pPr lvl="1"/>
+            <a:r>
+              <a:rPr lang="en-GB" dirty="0"/>
+              <a:t>Both R and Q (In theory)</a:t>
+            </a:r>
+          </a:p>
+          <a:p>
+            <a:r>
+              <a:rPr lang="en-GB" dirty="0"/>
+              <a:t>Split graphs and compute CNEES values</a:t>
+            </a:r>
+          </a:p>
+          <a:p>
+            <a:r>
+              <a:rPr lang="en-GB" dirty="0"/>
+              <a:t>Try orb-slam</a:t>
+            </a:r>
+          </a:p>
+          <a:p>
+            <a:endParaRPr lang="en-GB" dirty="0"/>
+          </a:p>
+          <a:p>
+            <a:r>
+              <a:rPr lang="en-GB" dirty="0"/>
+              <a:t>Continue writing report</a:t>
+            </a:r>
+          </a:p>
           <a:p>
             <a:endParaRPr lang="en-GB" dirty="0"/>
           </a:p>
@@ -3783,7 +3854,7 @@
                 <a:effectLst/>
                 <a:latin typeface="Calibri" panose="020F0502020204030204" pitchFamily="34" charset="0"/>
               </a:rPr>
-              <a:t>enerate surface plots for all linear systems and GPS systems</a:t>
+              <a:t>enerate surface plots for linear systems and GPS systems</a:t>
             </a:r>
           </a:p>
           <a:p>

</xml_diff>